<commit_message>
Change to java version 1.7 and update ppts
</commit_message>
<xml_diff>
--- a/JavaBasics-master/doc/Java Basics - [1] Java Technology.pptx
+++ b/JavaBasics-master/doc/Java Basics - [1] Java Technology.pptx
@@ -282,7 +282,7 @@
           <a:p>
             <a:fld id="{E23C31A4-E588-4D7D-8556-3E7A80E3618E}" type="datetimeFigureOut">
               <a:rPr lang="es-MX" smtClean="0"/>
-              <a:t>18/08/2015</a:t>
+              <a:t>09/11/2016</a:t>
             </a:fld>
             <a:endParaRPr lang="es-MX"/>
           </a:p>
@@ -460,7 +460,7 @@
               <a:pPr>
                 <a:defRPr/>
               </a:pPr>
-              <a:t>18/08/2015</a:t>
+              <a:t>09/11/2016</a:t>
             </a:fld>
             <a:endParaRPr lang="es-MX" dirty="0"/>
           </a:p>
@@ -13046,7 +13046,6 @@
               <a:rPr lang="es-MX" dirty="0"/>
               <a:t>.</a:t>
             </a:r>
-            <a:endParaRPr lang="es-MX" dirty="0"/>
           </a:p>
         </p:txBody>
       </p:sp>
@@ -16661,7 +16660,6 @@
               <a:rPr lang="es-MX" b="1" dirty="0"/>
               <a:t>;</a:t>
             </a:r>
-            <a:endParaRPr lang="es-MX" b="1" dirty="0"/>
           </a:p>
         </p:txBody>
       </p:sp>
@@ -16863,7 +16861,6 @@
               <a:rPr lang="es-MX" b="1" dirty="0"/>
               <a:t>.*;</a:t>
             </a:r>
-            <a:endParaRPr lang="es-MX" b="1" dirty="0"/>
           </a:p>
         </p:txBody>
       </p:sp>
@@ -17164,16 +17161,17 @@
           <a:lstStyle/>
           <a:p>
             <a:r>
-              <a:rPr lang="en-US" dirty="0"/>
-              <a:t>Diego Olvera</a:t>
-            </a:r>
-          </a:p>
-          <a:p>
-            <a:r>
-              <a:rPr lang="en-US" dirty="0">
+              <a:rPr lang="en-US" smtClean="0"/>
+              <a:t>Sarahi Flores</a:t>
+            </a:r>
+            <a:endParaRPr lang="en-US" dirty="0" smtClean="0"/>
+          </a:p>
+          <a:p>
+            <a:r>
+              <a:rPr lang="en-US" dirty="0" smtClean="0">
                 <a:hlinkClick r:id="rId2"/>
               </a:rPr>
-              <a:t>diego.olvera@softtek.com</a:t>
+              <a:t>sarahi.flores@softtek.com</a:t>
             </a:r>
             <a:endParaRPr lang="en-US" dirty="0"/>
           </a:p>

</xml_diff>